<commit_message>
added cloud details and modified python code
</commit_message>
<xml_diff>
--- a/Cloud_Computing/Labs/Assignment/part 2/Cloud-Computing-Assignment-2.pptx
+++ b/Cloud_Computing/Labs/Assignment/part 2/Cloud-Computing-Assignment-2.pptx
@@ -4088,14 +4088,14 @@
             <p:ph idx="1"/>
             <p:extLst>
               <p:ext uri="{D42A27DB-BD31-4B8C-83A1-F6EECF244321}">
-                <p14:modId xmlns:p14="http://schemas.microsoft.com/office/powerpoint/2010/main" val="4151876687"/>
+                <p14:modId xmlns:p14="http://schemas.microsoft.com/office/powerpoint/2010/main" val="4196336964"/>
               </p:ext>
             </p:extLst>
           </p:nvPr>
         </p:nvGraphicFramePr>
         <p:xfrm>
           <a:off x="768743" y="1825625"/>
-          <a:ext cx="10585057" cy="1381760"/>
+          <a:ext cx="10585057" cy="1112520"/>
         </p:xfrm>
         <a:graphic>
           <a:graphicData uri="http://schemas.openxmlformats.org/drawingml/2006/table">
@@ -4253,13 +4253,7 @@
                     <a:p>
                       <a:r>
                         <a:rPr lang="en-IE" dirty="0"/>
-                        <a:t>US-West 1 or </a:t>
-                      </a:r>
-                    </a:p>
-                    <a:p>
-                      <a:r>
-                        <a:rPr lang="en-IE" dirty="0"/>
-                        <a:t>EU West 1</a:t>
+                        <a:t>US-West 1</a:t>
                       </a:r>
                     </a:p>
                   </a:txBody>
@@ -4300,7 +4294,10 @@
                     <a:bodyPr/>
                     <a:lstStyle/>
                     <a:p>
-                      <a:endParaRPr lang="en-IE"/>
+                      <a:r>
+                        <a:rPr lang="en-IE" dirty="0"/>
+                        <a:t>6</a:t>
+                      </a:r>
                     </a:p>
                   </a:txBody>
                   <a:tcPr/>
@@ -4386,7 +4383,10 @@
                     <a:bodyPr/>
                     <a:lstStyle/>
                     <a:p>
-                      <a:endParaRPr lang="en-IE"/>
+                      <a:r>
+                        <a:rPr lang="en-IE" dirty="0"/>
+                        <a:t>6</a:t>
+                      </a:r>
                     </a:p>
                   </a:txBody>
                   <a:tcPr/>
@@ -5219,7 +5219,7 @@
             <p:ph idx="1"/>
             <p:extLst>
               <p:ext uri="{D42A27DB-BD31-4B8C-83A1-F6EECF244321}">
-                <p14:modId xmlns:p14="http://schemas.microsoft.com/office/powerpoint/2010/main" val="157443310"/>
+                <p14:modId xmlns:p14="http://schemas.microsoft.com/office/powerpoint/2010/main" val="890339126"/>
               </p:ext>
             </p:extLst>
           </p:nvPr>
@@ -5358,27 +5358,40 @@
                     <a:bodyPr/>
                     <a:lstStyle/>
                     <a:p>
-                      <a:endParaRPr lang="en-IE"/>
-                    </a:p>
-                  </a:txBody>
-                  <a:tcPr/>
-                </a:tc>
-                <a:tc>
-                  <a:txBody>
-                    <a:bodyPr/>
-                    <a:lstStyle/>
-                    <a:p>
-                      <a:endParaRPr lang="en-IE"/>
-                    </a:p>
-                  </a:txBody>
-                  <a:tcPr/>
-                </a:tc>
-                <a:tc>
-                  <a:txBody>
-                    <a:bodyPr/>
-                    <a:lstStyle/>
-                    <a:p>
-                      <a:endParaRPr lang="en-IE"/>
+                      <a:r>
+                        <a:rPr lang="en-IE" dirty="0" err="1"/>
+                        <a:t>Elb</a:t>
+                      </a:r>
+                      <a:r>
+                        <a:rPr lang="en-IE" dirty="0"/>
+                        <a:t>-sg</a:t>
+                      </a:r>
+                    </a:p>
+                  </a:txBody>
+                  <a:tcPr/>
+                </a:tc>
+                <a:tc>
+                  <a:txBody>
+                    <a:bodyPr/>
+                    <a:lstStyle/>
+                    <a:p>
+                      <a:r>
+                        <a:rPr lang="en-IE" dirty="0"/>
+                        <a:t>Allow 443</a:t>
+                      </a:r>
+                    </a:p>
+                  </a:txBody>
+                  <a:tcPr/>
+                </a:tc>
+                <a:tc>
+                  <a:txBody>
+                    <a:bodyPr/>
+                    <a:lstStyle/>
+                    <a:p>
+                      <a:r>
+                        <a:rPr lang="en-IE" dirty="0"/>
+                        <a:t>0.0.0.0/0</a:t>
+                      </a:r>
                     </a:p>
                   </a:txBody>
                   <a:tcPr/>
@@ -5408,27 +5421,36 @@
                     <a:bodyPr/>
                     <a:lstStyle/>
                     <a:p>
-                      <a:endParaRPr lang="en-IE"/>
-                    </a:p>
-                  </a:txBody>
-                  <a:tcPr/>
-                </a:tc>
-                <a:tc>
-                  <a:txBody>
-                    <a:bodyPr/>
-                    <a:lstStyle/>
-                    <a:p>
-                      <a:endParaRPr lang="en-IE"/>
-                    </a:p>
-                  </a:txBody>
-                  <a:tcPr/>
-                </a:tc>
-                <a:tc>
-                  <a:txBody>
-                    <a:bodyPr/>
-                    <a:lstStyle/>
-                    <a:p>
-                      <a:endParaRPr lang="en-IE"/>
+                      <a:r>
+                        <a:rPr lang="en-IE" dirty="0"/>
+                        <a:t>Web-sg</a:t>
+                      </a:r>
+                    </a:p>
+                  </a:txBody>
+                  <a:tcPr/>
+                </a:tc>
+                <a:tc>
+                  <a:txBody>
+                    <a:bodyPr/>
+                    <a:lstStyle/>
+                    <a:p>
+                      <a:r>
+                        <a:rPr lang="en-IE" dirty="0"/>
+                        <a:t>Allow 8080</a:t>
+                      </a:r>
+                    </a:p>
+                  </a:txBody>
+                  <a:tcPr/>
+                </a:tc>
+                <a:tc>
+                  <a:txBody>
+                    <a:bodyPr/>
+                    <a:lstStyle/>
+                    <a:p>
+                      <a:r>
+                        <a:rPr lang="en-IE" dirty="0"/>
+                        <a:t>ELB</a:t>
+                      </a:r>
                     </a:p>
                   </a:txBody>
                   <a:tcPr/>
@@ -5458,27 +5480,36 @@
                     <a:bodyPr/>
                     <a:lstStyle/>
                     <a:p>
-                      <a:endParaRPr lang="en-IE" dirty="0"/>
-                    </a:p>
-                  </a:txBody>
-                  <a:tcPr/>
-                </a:tc>
-                <a:tc>
-                  <a:txBody>
-                    <a:bodyPr/>
-                    <a:lstStyle/>
-                    <a:p>
-                      <a:endParaRPr lang="en-IE"/>
-                    </a:p>
-                  </a:txBody>
-                  <a:tcPr/>
-                </a:tc>
-                <a:tc>
-                  <a:txBody>
-                    <a:bodyPr/>
-                    <a:lstStyle/>
-                    <a:p>
-                      <a:endParaRPr lang="en-IE"/>
+                      <a:r>
+                        <a:rPr lang="en-IE" dirty="0"/>
+                        <a:t>App-sg</a:t>
+                      </a:r>
+                    </a:p>
+                  </a:txBody>
+                  <a:tcPr/>
+                </a:tc>
+                <a:tc>
+                  <a:txBody>
+                    <a:bodyPr/>
+                    <a:lstStyle/>
+                    <a:p>
+                      <a:r>
+                        <a:rPr lang="en-IE" dirty="0"/>
+                        <a:t>Allow 8080</a:t>
+                      </a:r>
+                    </a:p>
+                  </a:txBody>
+                  <a:tcPr/>
+                </a:tc>
+                <a:tc>
+                  <a:txBody>
+                    <a:bodyPr/>
+                    <a:lstStyle/>
+                    <a:p>
+                      <a:r>
+                        <a:rPr lang="en-IE" dirty="0"/>
+                        <a:t>Web tier</a:t>
+                      </a:r>
                     </a:p>
                   </a:txBody>
                   <a:tcPr/>
@@ -5508,27 +5539,36 @@
                     <a:bodyPr/>
                     <a:lstStyle/>
                     <a:p>
-                      <a:endParaRPr lang="en-IE"/>
-                    </a:p>
-                  </a:txBody>
-                  <a:tcPr/>
-                </a:tc>
-                <a:tc>
-                  <a:txBody>
-                    <a:bodyPr/>
-                    <a:lstStyle/>
-                    <a:p>
-                      <a:endParaRPr lang="en-IE"/>
-                    </a:p>
-                  </a:txBody>
-                  <a:tcPr/>
-                </a:tc>
-                <a:tc>
-                  <a:txBody>
-                    <a:bodyPr/>
-                    <a:lstStyle/>
-                    <a:p>
-                      <a:endParaRPr lang="en-IE" dirty="0"/>
+                      <a:r>
+                        <a:rPr lang="en-IE" dirty="0"/>
+                        <a:t>Db-sg</a:t>
+                      </a:r>
+                    </a:p>
+                  </a:txBody>
+                  <a:tcPr/>
+                </a:tc>
+                <a:tc>
+                  <a:txBody>
+                    <a:bodyPr/>
+                    <a:lstStyle/>
+                    <a:p>
+                      <a:r>
+                        <a:rPr lang="en-IE" dirty="0"/>
+                        <a:t>Allow 3306</a:t>
+                      </a:r>
+                    </a:p>
+                  </a:txBody>
+                  <a:tcPr/>
+                </a:tc>
+                <a:tc>
+                  <a:txBody>
+                    <a:bodyPr/>
+                    <a:lstStyle/>
+                    <a:p>
+                      <a:r>
+                        <a:rPr lang="en-IE" dirty="0"/>
+                        <a:t>App tier</a:t>
+                      </a:r>
                     </a:p>
                   </a:txBody>
                   <a:tcPr/>
@@ -6043,14 +6083,14 @@
             <p:ph idx="1"/>
             <p:extLst>
               <p:ext uri="{D42A27DB-BD31-4B8C-83A1-F6EECF244321}">
-                <p14:modId xmlns:p14="http://schemas.microsoft.com/office/powerpoint/2010/main" val="1233115907"/>
+                <p14:modId xmlns:p14="http://schemas.microsoft.com/office/powerpoint/2010/main" val="1556941435"/>
               </p:ext>
             </p:extLst>
           </p:nvPr>
         </p:nvGraphicFramePr>
         <p:xfrm>
-          <a:off x="838200" y="1825625"/>
-          <a:ext cx="10515603" cy="2570480"/>
+          <a:off x="838200" y="1825624"/>
+          <a:ext cx="10515603" cy="3150978"/>
         </p:xfrm>
         <a:graphic>
           <a:graphicData uri="http://schemas.openxmlformats.org/drawingml/2006/table">
@@ -6109,7 +6149,7 @@
                   </a:extLst>
                 </a:gridCol>
               </a:tblGrid>
-              <a:tr h="370840">
+              <a:tr h="454588">
                 <a:tc>
                   <a:txBody>
                     <a:bodyPr/>
@@ -6235,7 +6275,7 @@
                   </a:ext>
                 </a:extLst>
               </a:tr>
-              <a:tr h="370840">
+              <a:tr h="1120901">
                 <a:tc>
                   <a:txBody>
                     <a:bodyPr/>
@@ -6258,7 +6298,10 @@
                     <a:bodyPr/>
                     <a:lstStyle/>
                     <a:p>
-                      <a:endParaRPr lang="en-IE" dirty="0"/>
+                      <a:r>
+                        <a:rPr lang="en-IE" dirty="0"/>
+                        <a:t>Amazon Linux</a:t>
+                      </a:r>
                     </a:p>
                   </a:txBody>
                   <a:tcPr/>
@@ -6281,7 +6324,23 @@
                     <a:bodyPr/>
                     <a:lstStyle/>
                     <a:p>
-                      <a:endParaRPr lang="en-IE" dirty="0"/>
+                      <a:r>
+                        <a:rPr lang="en-IE" dirty="0"/>
+                        <a:t>T2</a:t>
+                      </a:r>
+                    </a:p>
+                  </a:txBody>
+                  <a:tcPr/>
+                </a:tc>
+                <a:tc>
+                  <a:txBody>
+                    <a:bodyPr/>
+                    <a:lstStyle/>
+                    <a:p>
+                      <a:r>
+                        <a:rPr lang="en-IE" dirty="0"/>
+                        <a:t>Large</a:t>
+                      </a:r>
                     </a:p>
                   </a:txBody>
                   <a:tcPr/>
@@ -6301,17 +6360,10 @@
                     <a:bodyPr/>
                     <a:lstStyle/>
                     <a:p>
-                      <a:endParaRPr lang="en-IE"/>
-                    </a:p>
-                  </a:txBody>
-                  <a:tcPr/>
-                </a:tc>
-                <a:tc>
-                  <a:txBody>
-                    <a:bodyPr/>
-                    <a:lstStyle/>
-                    <a:p>
-                      <a:endParaRPr lang="en-IE"/>
+                      <a:r>
+                        <a:rPr lang="en-IE" dirty="0"/>
+                        <a:t>6</a:t>
+                      </a:r>
                     </a:p>
                   </a:txBody>
                   <a:tcPr/>
@@ -6322,7 +6374,7 @@
                   </a:ext>
                 </a:extLst>
               </a:tr>
-              <a:tr h="370840">
+              <a:tr h="1120901">
                 <a:tc>
                   <a:txBody>
                     <a:bodyPr/>
@@ -6341,7 +6393,10 @@
                     <a:bodyPr/>
                     <a:lstStyle/>
                     <a:p>
-                      <a:endParaRPr lang="en-IE"/>
+                      <a:r>
+                        <a:rPr lang="en-IE" dirty="0"/>
+                        <a:t>Amazon Linux</a:t>
+                      </a:r>
                     </a:p>
                   </a:txBody>
                   <a:tcPr/>
@@ -6364,6 +6419,32 @@
                     <a:bodyPr/>
                     <a:lstStyle/>
                     <a:p>
+                      <a:r>
+                        <a:rPr lang="en-IE" dirty="0"/>
+                        <a:t>R5</a:t>
+                      </a:r>
+                    </a:p>
+                  </a:txBody>
+                  <a:tcPr/>
+                </a:tc>
+                <a:tc>
+                  <a:txBody>
+                    <a:bodyPr/>
+                    <a:lstStyle/>
+                    <a:p>
+                      <a:r>
+                        <a:rPr lang="en-IE" dirty="0"/>
+                        <a:t>2xLarge</a:t>
+                      </a:r>
+                    </a:p>
+                  </a:txBody>
+                  <a:tcPr/>
+                </a:tc>
+                <a:tc>
+                  <a:txBody>
+                    <a:bodyPr/>
+                    <a:lstStyle/>
+                    <a:p>
                       <a:endParaRPr lang="en-IE"/>
                     </a:p>
                   </a:txBody>
@@ -6374,27 +6455,10 @@
                     <a:bodyPr/>
                     <a:lstStyle/>
                     <a:p>
-                      <a:endParaRPr lang="en-IE"/>
-                    </a:p>
-                  </a:txBody>
-                  <a:tcPr/>
-                </a:tc>
-                <a:tc>
-                  <a:txBody>
-                    <a:bodyPr/>
-                    <a:lstStyle/>
-                    <a:p>
-                      <a:endParaRPr lang="en-IE"/>
-                    </a:p>
-                  </a:txBody>
-                  <a:tcPr/>
-                </a:tc>
-                <a:tc>
-                  <a:txBody>
-                    <a:bodyPr/>
-                    <a:lstStyle/>
-                    <a:p>
-                      <a:endParaRPr lang="en-IE"/>
+                      <a:r>
+                        <a:rPr lang="en-IE" dirty="0"/>
+                        <a:t>6</a:t>
+                      </a:r>
                     </a:p>
                   </a:txBody>
                   <a:tcPr/>
@@ -6405,7 +6469,7 @@
                   </a:ext>
                 </a:extLst>
               </a:tr>
-              <a:tr h="370840">
+              <a:tr h="454588">
                 <a:tc>
                   <a:txBody>
                     <a:bodyPr/>
@@ -6424,16 +6488,6 @@
                     <a:bodyPr/>
                     <a:lstStyle/>
                     <a:p>
-                      <a:endParaRPr lang="en-IE" dirty="0"/>
-                    </a:p>
-                  </a:txBody>
-                  <a:tcPr/>
-                </a:tc>
-                <a:tc>
-                  <a:txBody>
-                    <a:bodyPr/>
-                    <a:lstStyle/>
-                    <a:p>
                       <a:r>
                         <a:rPr lang="en-IE" dirty="0"/>
                         <a:t>N/A</a:t>
@@ -6447,7 +6501,36 @@
                     <a:bodyPr/>
                     <a:lstStyle/>
                     <a:p>
-                      <a:endParaRPr lang="en-IE" dirty="0"/>
+                      <a:r>
+                        <a:rPr lang="en-IE" dirty="0"/>
+                        <a:t>N/A</a:t>
+                      </a:r>
+                    </a:p>
+                  </a:txBody>
+                  <a:tcPr/>
+                </a:tc>
+                <a:tc>
+                  <a:txBody>
+                    <a:bodyPr/>
+                    <a:lstStyle/>
+                    <a:p>
+                      <a:r>
+                        <a:rPr lang="en-IE" dirty="0"/>
+                        <a:t>DB.R5</a:t>
+                      </a:r>
+                    </a:p>
+                  </a:txBody>
+                  <a:tcPr/>
+                </a:tc>
+                <a:tc>
+                  <a:txBody>
+                    <a:bodyPr/>
+                    <a:lstStyle/>
+                    <a:p>
+                      <a:r>
+                        <a:rPr lang="en-IE" dirty="0"/>
+                        <a:t>2xLarge</a:t>
+                      </a:r>
                     </a:p>
                   </a:txBody>
                   <a:tcPr/>
@@ -6467,17 +6550,10 @@
                     <a:bodyPr/>
                     <a:lstStyle/>
                     <a:p>
-                      <a:endParaRPr lang="en-IE"/>
-                    </a:p>
-                  </a:txBody>
-                  <a:tcPr/>
-                </a:tc>
-                <a:tc>
-                  <a:txBody>
-                    <a:bodyPr/>
-                    <a:lstStyle/>
-                    <a:p>
-                      <a:endParaRPr lang="en-IE" dirty="0"/>
+                      <a:r>
+                        <a:rPr lang="en-IE" dirty="0"/>
+                        <a:t>N/A</a:t>
+                      </a:r>
                     </a:p>
                   </a:txBody>
                   <a:tcPr/>
@@ -6538,7 +6614,12 @@
             <p:ph type="title"/>
           </p:nvPr>
         </p:nvSpPr>
-        <p:spPr/>
+        <p:spPr>
+          <a:xfrm>
+            <a:off x="838200" y="365126"/>
+            <a:ext cx="10515600" cy="1285650"/>
+          </a:xfrm>
+        </p:spPr>
         <p:txBody>
           <a:bodyPr/>
           <a:lstStyle/>
@@ -6566,7 +6647,12 @@
             <p:ph idx="1"/>
           </p:nvPr>
         </p:nvSpPr>
-        <p:spPr/>
+        <p:spPr>
+          <a:xfrm>
+            <a:off x="838200" y="1825625"/>
+            <a:ext cx="10515600" cy="1192704"/>
+          </a:xfrm>
+        </p:spPr>
         <p:txBody>
           <a:bodyPr/>
           <a:lstStyle/>
@@ -6575,6 +6661,22 @@
               <a:rPr lang="en-IE" dirty="0"/>
               <a:t>Q: How would you achieve a Recovery Point Objective of four hours?</a:t>
             </a:r>
+          </a:p>
+          <a:p>
+            <a:pPr marL="0" indent="0">
+              <a:buNone/>
+            </a:pPr>
+            <a:r>
+              <a:rPr lang="en-US" sz="2000" dirty="0"/>
+              <a:t>Since all the servers working are virtual / Software rather then hardware, We can create images dynamically every four hours</a:t>
+            </a:r>
+            <a:r>
+              <a:rPr lang="en-GB" sz="2000" dirty="0"/>
+              <a:t> and save them inside the RDS Database.</a:t>
+            </a:r>
+          </a:p>
+          <a:p>
+            <a:endParaRPr lang="en-IE" dirty="0"/>
           </a:p>
         </p:txBody>
       </p:sp>
@@ -6624,7 +6726,12 @@
             <p:ph type="title"/>
           </p:nvPr>
         </p:nvSpPr>
-        <p:spPr/>
+        <p:spPr>
+          <a:xfrm>
+            <a:off x="611623" y="219469"/>
+            <a:ext cx="10515600" cy="1325563"/>
+          </a:xfrm>
+        </p:spPr>
         <p:txBody>
           <a:bodyPr/>
           <a:lstStyle/>

</xml_diff>

<commit_message>
nearly completed Cloud Computing
</commit_message>
<xml_diff>
--- a/Cloud_Computing/Labs/Assignment/part 2/Cloud-Computing-Assignment-2.pptx
+++ b/Cloud_Computing/Labs/Assignment/part 2/Cloud-Computing-Assignment-2.pptx
@@ -16,8 +16,7 @@
     <p:sldId id="265" r:id="rId10"/>
     <p:sldId id="266" r:id="rId11"/>
     <p:sldId id="267" r:id="rId12"/>
-    <p:sldId id="268" r:id="rId13"/>
-    <p:sldId id="269" r:id="rId14"/>
+    <p:sldId id="269" r:id="rId13"/>
   </p:sldIdLst>
   <p:sldSz cx="12192000" cy="6858000"/>
   <p:notesSz cx="6858000" cy="9144000"/>
@@ -3375,14 +3374,26 @@
             <p:ph type="ctrTitle"/>
           </p:nvPr>
         </p:nvSpPr>
-        <p:spPr/>
+        <p:spPr>
+          <a:xfrm>
+            <a:off x="710213" y="584277"/>
+            <a:ext cx="10599937" cy="2387600"/>
+          </a:xfrm>
+        </p:spPr>
         <p:txBody>
           <a:bodyPr/>
           <a:lstStyle/>
           <a:p>
             <a:r>
               <a:rPr lang="en-IE" dirty="0"/>
-              <a:t>Cloud Computing Assignment 2</a:t>
+              <a:t>Cloud Computing Assignment </a:t>
+            </a:r>
+            <a:br>
+              <a:rPr lang="en-IE" dirty="0"/>
+            </a:br>
+            <a:r>
+              <a:rPr lang="en-IE" dirty="0"/>
+              <a:t>Final Part</a:t>
             </a:r>
           </a:p>
         </p:txBody>
@@ -3403,7 +3414,12 @@
             <p:ph type="subTitle" idx="1"/>
           </p:nvPr>
         </p:nvSpPr>
-        <p:spPr/>
+        <p:spPr>
+          <a:xfrm>
+            <a:off x="1524000" y="3886123"/>
+            <a:ext cx="9144000" cy="1655762"/>
+          </a:xfrm>
+        </p:spPr>
         <p:txBody>
           <a:bodyPr/>
           <a:lstStyle/>
@@ -3422,7 +3438,7 @@
           <a:p>
             <a:r>
               <a:rPr lang="en-IE" dirty="0"/>
-              <a:t>DT228 3</a:t>
+              <a:t>DT228-3</a:t>
             </a:r>
           </a:p>
         </p:txBody>
@@ -3506,7 +3522,49 @@
           <a:bodyPr/>
           <a:lstStyle/>
           <a:p>
-            <a:endParaRPr lang="en-IE"/>
+            <a:pPr marL="0" indent="0">
+              <a:buNone/>
+            </a:pPr>
+            <a:r>
+              <a:rPr lang="en-IE" dirty="0"/>
+              <a:t>IAM:</a:t>
+            </a:r>
+          </a:p>
+          <a:p>
+            <a:pPr marL="0" indent="0">
+              <a:buNone/>
+            </a:pPr>
+            <a:r>
+              <a:rPr lang="en-IE" dirty="0"/>
+              <a:t> Group : </a:t>
+            </a:r>
+          </a:p>
+          <a:p>
+            <a:pPr marL="0" indent="0">
+              <a:buNone/>
+            </a:pPr>
+            <a:r>
+              <a:rPr lang="en-IE" dirty="0"/>
+              <a:t>	Cloud Team only have Access to AWS services</a:t>
+            </a:r>
+          </a:p>
+          <a:p>
+            <a:pPr marL="0" indent="0">
+              <a:buNone/>
+            </a:pPr>
+            <a:r>
+              <a:rPr lang="en-IE" dirty="0"/>
+              <a:t>	Sale Personals use instances to read and write to S3 products in 	regard to images and the document</a:t>
+            </a:r>
+          </a:p>
+          <a:p>
+            <a:pPr marL="0" indent="0">
+              <a:buNone/>
+            </a:pPr>
+            <a:endParaRPr lang="en-IE" dirty="0"/>
+          </a:p>
+          <a:p>
+            <a:endParaRPr lang="en-IE" dirty="0"/>
           </a:p>
         </p:txBody>
       </p:sp>
@@ -3589,7 +3647,10 @@
           <a:bodyPr/>
           <a:lstStyle/>
           <a:p>
-            <a:endParaRPr lang="en-IE" dirty="0"/>
+            <a:r>
+              <a:rPr lang="en-IE" dirty="0"/>
+              <a:t>According to the Assignment document, this part is optional</a:t>
+            </a:r>
           </a:p>
         </p:txBody>
       </p:sp>
@@ -3607,89 +3668,6 @@
 </file>
 
 <file path=ppt/slides/slide12.xml><?xml version="1.0" encoding="utf-8"?>
-<p:sld xmlns:a="http://schemas.openxmlformats.org/drawingml/2006/main" xmlns:r="http://schemas.openxmlformats.org/officeDocument/2006/relationships" xmlns:p="http://schemas.openxmlformats.org/presentationml/2006/main">
-  <p:cSld>
-    <p:spTree>
-      <p:nvGrpSpPr>
-        <p:cNvPr id="1" name=""/>
-        <p:cNvGrpSpPr/>
-        <p:nvPr/>
-      </p:nvGrpSpPr>
-      <p:grpSpPr>
-        <a:xfrm>
-          <a:off x="0" y="0"/>
-          <a:ext cx="0" cy="0"/>
-          <a:chOff x="0" y="0"/>
-          <a:chExt cx="0" cy="0"/>
-        </a:xfrm>
-      </p:grpSpPr>
-      <p:sp>
-        <p:nvSpPr>
-          <p:cNvPr id="2" name="Title 1">
-            <a:extLst>
-              <a:ext uri="{FF2B5EF4-FFF2-40B4-BE49-F238E27FC236}">
-                <a16:creationId xmlns:a16="http://schemas.microsoft.com/office/drawing/2014/main" id="{1D48DEC2-528A-4F9F-9234-3E7EF5A2D6A3}"/>
-              </a:ext>
-            </a:extLst>
-          </p:cNvPr>
-          <p:cNvSpPr>
-            <a:spLocks noGrp="1"/>
-          </p:cNvSpPr>
-          <p:nvPr>
-            <p:ph type="title"/>
-          </p:nvPr>
-        </p:nvSpPr>
-        <p:spPr/>
-        <p:txBody>
-          <a:bodyPr/>
-          <a:lstStyle/>
-          <a:p>
-            <a:r>
-              <a:rPr lang="en-IE" dirty="0"/>
-              <a:t>Architecture Diagram</a:t>
-            </a:r>
-          </a:p>
-        </p:txBody>
-      </p:sp>
-      <p:sp>
-        <p:nvSpPr>
-          <p:cNvPr id="3" name="Content Placeholder 2">
-            <a:extLst>
-              <a:ext uri="{FF2B5EF4-FFF2-40B4-BE49-F238E27FC236}">
-                <a16:creationId xmlns:a16="http://schemas.microsoft.com/office/drawing/2014/main" id="{F4B63F9A-7036-414D-ABC6-1023DA0EB93F}"/>
-              </a:ext>
-            </a:extLst>
-          </p:cNvPr>
-          <p:cNvSpPr>
-            <a:spLocks noGrp="1"/>
-          </p:cNvSpPr>
-          <p:nvPr>
-            <p:ph idx="1"/>
-          </p:nvPr>
-        </p:nvSpPr>
-        <p:spPr/>
-        <p:txBody>
-          <a:bodyPr/>
-          <a:lstStyle/>
-          <a:p>
-            <a:endParaRPr lang="en-IE" dirty="0"/>
-          </a:p>
-        </p:txBody>
-      </p:sp>
-    </p:spTree>
-    <p:extLst>
-      <p:ext uri="{BB962C8B-B14F-4D97-AF65-F5344CB8AC3E}">
-        <p14:creationId xmlns:p14="http://schemas.microsoft.com/office/powerpoint/2010/main" val="3645232321"/>
-      </p:ext>
-    </p:extLst>
-  </p:cSld>
-  <p:clrMapOvr>
-    <a:masterClrMapping/>
-  </p:clrMapOvr>
-</p:sld>
-</file>
-
-<file path=ppt/slides/slide13.xml><?xml version="1.0" encoding="utf-8"?>
 <p:sld xmlns:a="http://schemas.openxmlformats.org/drawingml/2006/main" xmlns:r="http://schemas.openxmlformats.org/officeDocument/2006/relationships" xmlns:p="http://schemas.openxmlformats.org/presentationml/2006/main">
   <p:cSld>
     <p:spTree>
@@ -5348,14 +5326,14 @@
           <p:nvPr>
             <p:extLst>
               <p:ext uri="{D42A27DB-BD31-4B8C-83A1-F6EECF244321}">
-                <p14:modId xmlns:p14="http://schemas.microsoft.com/office/powerpoint/2010/main" val="2112408047"/>
+                <p14:modId xmlns:p14="http://schemas.microsoft.com/office/powerpoint/2010/main" val="2822591859"/>
               </p:ext>
             </p:extLst>
           </p:nvPr>
         </p:nvGraphicFramePr>
         <p:xfrm>
           <a:off x="1125178" y="3435069"/>
-          <a:ext cx="9941644" cy="1854200"/>
+          <a:ext cx="9941644" cy="2392680"/>
         </p:xfrm>
         <a:graphic>
           <a:graphicData uri="http://schemas.openxmlformats.org/drawingml/2006/table">
@@ -5459,17 +5437,23 @@
                     <a:bodyPr/>
                     <a:lstStyle/>
                     <a:p>
-                      <a:endParaRPr lang="en-IE" dirty="0"/>
-                    </a:p>
-                  </a:txBody>
-                  <a:tcPr/>
-                </a:tc>
-                <a:tc>
-                  <a:txBody>
-                    <a:bodyPr/>
-                    <a:lstStyle/>
-                    <a:p>
-                      <a:endParaRPr lang="en-IE" dirty="0"/>
+                      <a:r>
+                        <a:rPr lang="en-IE" dirty="0"/>
+                        <a:t>Network Access Control Lists</a:t>
+                      </a:r>
+                    </a:p>
+                  </a:txBody>
+                  <a:tcPr/>
+                </a:tc>
+                <a:tc>
+                  <a:txBody>
+                    <a:bodyPr/>
+                    <a:lstStyle/>
+                    <a:p>
+                      <a:r>
+                        <a:rPr lang="en-IE" dirty="0"/>
+                        <a:t>This is to protect the subnet levels by acting as a firewall for the stateless servers, controlling the (in/out) bound traffic at subnet level</a:t>
+                      </a:r>
                     </a:p>
                   </a:txBody>
                   <a:tcPr/>
@@ -5486,17 +5470,23 @@
                     <a:bodyPr/>
                     <a:lstStyle/>
                     <a:p>
-                      <a:endParaRPr lang="en-IE"/>
-                    </a:p>
-                  </a:txBody>
-                  <a:tcPr/>
-                </a:tc>
-                <a:tc>
-                  <a:txBody>
-                    <a:bodyPr/>
-                    <a:lstStyle/>
-                    <a:p>
-                      <a:endParaRPr lang="en-IE"/>
+                      <a:r>
+                        <a:rPr lang="en-IE" dirty="0"/>
+                        <a:t>AWS Marketplace</a:t>
+                      </a:r>
+                    </a:p>
+                  </a:txBody>
+                  <a:tcPr/>
+                </a:tc>
+                <a:tc>
+                  <a:txBody>
+                    <a:bodyPr/>
+                    <a:lstStyle/>
+                    <a:p>
+                      <a:r>
+                        <a:rPr lang="en-IE" dirty="0"/>
+                        <a:t>For any more Necessary Security benefits, the Marketplace can offer several Appliances</a:t>
+                      </a:r>
                     </a:p>
                   </a:txBody>
                   <a:tcPr/>
@@ -5612,14 +5602,14 @@
             <p:ph idx="1"/>
             <p:extLst>
               <p:ext uri="{D42A27DB-BD31-4B8C-83A1-F6EECF244321}">
-                <p14:modId xmlns:p14="http://schemas.microsoft.com/office/powerpoint/2010/main" val="2645835282"/>
+                <p14:modId xmlns:p14="http://schemas.microsoft.com/office/powerpoint/2010/main" val="2530768837"/>
               </p:ext>
             </p:extLst>
           </p:nvPr>
         </p:nvGraphicFramePr>
         <p:xfrm>
-          <a:off x="838200" y="1825625"/>
-          <a:ext cx="10515600" cy="1651000"/>
+          <a:off x="838200" y="1825624"/>
+          <a:ext cx="10515600" cy="2382233"/>
         </p:xfrm>
         <a:graphic>
           <a:graphicData uri="http://schemas.openxmlformats.org/drawingml/2006/table">
@@ -5643,7 +5633,7 @@
                   </a:extLst>
                 </a:gridCol>
               </a:tblGrid>
-              <a:tr h="370840">
+              <a:tr h="401624">
                 <a:tc>
                   <a:txBody>
                     <a:bodyPr/>
@@ -5684,7 +5674,7 @@
                   </a:ext>
                 </a:extLst>
               </a:tr>
-              <a:tr h="370840">
+              <a:tr h="1287396">
                 <a:tc>
                   <a:txBody>
                     <a:bodyPr/>
@@ -5703,7 +5693,28 @@
                     <a:bodyPr/>
                     <a:lstStyle/>
                     <a:p>
-                      <a:endParaRPr lang="en-IE"/>
+                      <a:r>
+                        <a:rPr lang="en-IE" dirty="0"/>
+                        <a:t>Enable the Amazon S3 Server Side encryption with S3 managed Keys</a:t>
+                      </a:r>
+                    </a:p>
+                    <a:p>
+                      <a:r>
+                        <a:rPr lang="en-IE" dirty="0"/>
+                        <a:t> EBS encryption using Block Level, such as Loop-AES</a:t>
+                      </a:r>
+                    </a:p>
+                    <a:p>
+                      <a:r>
+                        <a:rPr lang="en-IE" dirty="0"/>
+                        <a:t>Enable the data to be encrypted before it reached the RDS Storage</a:t>
+                      </a:r>
+                    </a:p>
+                    <a:p>
+                      <a:r>
+                        <a:rPr lang="en-IE" dirty="0"/>
+                        <a:t>Enable the Key Managed services to managed the Keys associated with the Encryption</a:t>
+                      </a:r>
                     </a:p>
                   </a:txBody>
                   <a:tcPr/>
@@ -5714,7 +5725,7 @@
                   </a:ext>
                 </a:extLst>
               </a:tr>
-              <a:tr h="370840">
+              <a:tr h="693213">
                 <a:tc>
                   <a:txBody>
                     <a:bodyPr/>
@@ -5750,7 +5761,16 @@
                     <a:bodyPr/>
                     <a:lstStyle/>
                     <a:p>
-                      <a:endParaRPr lang="en-IE" dirty="0"/>
+                      <a:r>
+                        <a:rPr lang="en-IE" dirty="0"/>
+                        <a:t>Enable Secure Socket Layer &amp; Transport Layer Security</a:t>
+                      </a:r>
+                    </a:p>
+                    <a:p>
+                      <a:r>
+                        <a:rPr lang="en-IE" dirty="0"/>
+                        <a:t>Client Side Encryption using the AWS KMS-Managed Customer Master Key</a:t>
+                      </a:r>
                     </a:p>
                   </a:txBody>
                   <a:tcPr/>
@@ -5839,14 +5859,14 @@
             <p:ph idx="1"/>
             <p:extLst>
               <p:ext uri="{D42A27DB-BD31-4B8C-83A1-F6EECF244321}">
-                <p14:modId xmlns:p14="http://schemas.microsoft.com/office/powerpoint/2010/main" val="1556941435"/>
+                <p14:modId xmlns:p14="http://schemas.microsoft.com/office/powerpoint/2010/main" val="1357570639"/>
               </p:ext>
             </p:extLst>
           </p:nvPr>
         </p:nvGraphicFramePr>
         <p:xfrm>
-          <a:off x="838200" y="1825624"/>
-          <a:ext cx="10515603" cy="3150978"/>
+          <a:off x="513805" y="1494699"/>
+          <a:ext cx="11390810" cy="4654867"/>
         </p:xfrm>
         <a:graphic>
           <a:graphicData uri="http://schemas.openxmlformats.org/drawingml/2006/table">
@@ -5855,49 +5875,49 @@
                 <a:tableStyleId>{00A15C55-8517-42AA-B614-E9B94910E393}</a:tableStyleId>
               </a:tblPr>
               <a:tblGrid>
-                <a:gridCol w="1502229">
+                <a:gridCol w="761745">
                   <a:extLst>
                     <a:ext uri="{9D8B030D-6E8A-4147-A177-3AD203B41FA5}">
                       <a16:colId xmlns:a16="http://schemas.microsoft.com/office/drawing/2014/main" val="2570424474"/>
                     </a:ext>
                   </a:extLst>
                 </a:gridCol>
-                <a:gridCol w="1502229">
+                <a:gridCol w="1572153">
                   <a:extLst>
                     <a:ext uri="{9D8B030D-6E8A-4147-A177-3AD203B41FA5}">
                       <a16:colId xmlns:a16="http://schemas.microsoft.com/office/drawing/2014/main" val="3753396623"/>
                     </a:ext>
                   </a:extLst>
                 </a:gridCol>
-                <a:gridCol w="1502229">
+                <a:gridCol w="1220127">
                   <a:extLst>
                     <a:ext uri="{9D8B030D-6E8A-4147-A177-3AD203B41FA5}">
                       <a16:colId xmlns:a16="http://schemas.microsoft.com/office/drawing/2014/main" val="3636661278"/>
                     </a:ext>
                   </a:extLst>
                 </a:gridCol>
-                <a:gridCol w="1502229">
+                <a:gridCol w="948307">
                   <a:extLst>
                     <a:ext uri="{9D8B030D-6E8A-4147-A177-3AD203B41FA5}">
                       <a16:colId xmlns:a16="http://schemas.microsoft.com/office/drawing/2014/main" val="2331909786"/>
                     </a:ext>
                   </a:extLst>
                 </a:gridCol>
-                <a:gridCol w="1502229">
+                <a:gridCol w="1088572">
                   <a:extLst>
                     <a:ext uri="{9D8B030D-6E8A-4147-A177-3AD203B41FA5}">
                       <a16:colId xmlns:a16="http://schemas.microsoft.com/office/drawing/2014/main" val="3235908227"/>
                     </a:ext>
                   </a:extLst>
                 </a:gridCol>
-                <a:gridCol w="1502229">
+                <a:gridCol w="4241074">
                   <a:extLst>
                     <a:ext uri="{9D8B030D-6E8A-4147-A177-3AD203B41FA5}">
                       <a16:colId xmlns:a16="http://schemas.microsoft.com/office/drawing/2014/main" val="406904880"/>
                     </a:ext>
                   </a:extLst>
                 </a:gridCol>
-                <a:gridCol w="1502229">
+                <a:gridCol w="1558832">
                   <a:extLst>
                     <a:ext uri="{9D8B030D-6E8A-4147-A177-3AD203B41FA5}">
                       <a16:colId xmlns:a16="http://schemas.microsoft.com/office/drawing/2014/main" val="2128464851"/>
@@ -5905,7 +5925,7 @@
                   </a:extLst>
                 </a:gridCol>
               </a:tblGrid>
-              <a:tr h="454588">
+              <a:tr h="540067">
                 <a:tc>
                   <a:txBody>
                     <a:bodyPr/>
@@ -6031,7 +6051,7 @@
                   </a:ext>
                 </a:extLst>
               </a:tr>
-              <a:tr h="1120901">
+              <a:tr h="1412241">
                 <a:tc>
                   <a:txBody>
                     <a:bodyPr/>
@@ -6069,7 +6089,22 @@
                     <a:p>
                       <a:r>
                         <a:rPr lang="en-IE" dirty="0"/>
-                        <a:t>Key: Name Value: app-tier</a:t>
+                        <a:t>Key: </a:t>
+                      </a:r>
+                    </a:p>
+                    <a:p>
+                      <a:r>
+                        <a:rPr lang="en-IE" dirty="0"/>
+                        <a:t>Name </a:t>
+                      </a:r>
+                    </a:p>
+                    <a:p>
+                      <a:endParaRPr lang="en-IE" dirty="0"/>
+                    </a:p>
+                    <a:p>
+                      <a:r>
+                        <a:rPr lang="en-IE" dirty="0"/>
+                        <a:t>Value: app-tier</a:t>
                       </a:r>
                     </a:p>
                   </a:txBody>
@@ -6106,7 +6141,10 @@
                     <a:bodyPr/>
                     <a:lstStyle/>
                     <a:p>
-                      <a:endParaRPr lang="en-IE"/>
+                      <a:r>
+                        <a:rPr lang="en-IE" dirty="0"/>
+                        <a:t>By expanding the size from what the server from its previous size to this new larger size, we expect the server capacity to reduce from 90% to between 50 and 60 percentage at all times</a:t>
+                      </a:r>
                     </a:p>
                   </a:txBody>
                   <a:tcPr/>
@@ -6130,7 +6168,7 @@
                   </a:ext>
                 </a:extLst>
               </a:tr>
-              <a:tr h="1120901">
+              <a:tr h="1412241">
                 <a:tc>
                   <a:txBody>
                     <a:bodyPr/>
@@ -6164,7 +6202,22 @@
                     <a:p>
                       <a:r>
                         <a:rPr lang="en-IE" dirty="0"/>
-                        <a:t>Key: Name Value: web-tier</a:t>
+                        <a:t>Key: </a:t>
+                      </a:r>
+                    </a:p>
+                    <a:p>
+                      <a:r>
+                        <a:rPr lang="en-IE" dirty="0"/>
+                        <a:t>Name </a:t>
+                      </a:r>
+                    </a:p>
+                    <a:p>
+                      <a:endParaRPr lang="en-IE" dirty="0"/>
+                    </a:p>
+                    <a:p>
+                      <a:r>
+                        <a:rPr lang="en-IE" dirty="0"/>
+                        <a:t>Value: web-tier</a:t>
                       </a:r>
                     </a:p>
                   </a:txBody>
@@ -6201,7 +6254,27 @@
                     <a:bodyPr/>
                     <a:lstStyle/>
                     <a:p>
-                      <a:endParaRPr lang="en-IE"/>
+                      <a:pPr marL="0" marR="0" lvl="0" indent="0" algn="l" defTabSz="914400" rtl="0" eaLnBrk="1" fontAlgn="auto" latinLnBrk="0" hangingPunct="1">
+                        <a:lnSpc>
+                          <a:spcPct val="100000"/>
+                        </a:lnSpc>
+                        <a:spcBef>
+                          <a:spcPts val="0"/>
+                        </a:spcBef>
+                        <a:spcAft>
+                          <a:spcPts val="0"/>
+                        </a:spcAft>
+                        <a:buClrTx/>
+                        <a:buSzTx/>
+                        <a:buFontTx/>
+                        <a:buNone/>
+                        <a:tabLst/>
+                        <a:defRPr/>
+                      </a:pPr>
+                      <a:r>
+                        <a:rPr lang="en-IE" dirty="0"/>
+                        <a:t>By expanding the size from what the server from its previous size to this new larger size, we expect the server capacity to reduce from 90% to between 50 and 60 percentage at all times</a:t>
+                      </a:r>
                     </a:p>
                   </a:txBody>
                   <a:tcPr/>
@@ -6225,7 +6298,7 @@
                   </a:ext>
                 </a:extLst>
               </a:tr>
-              <a:tr h="454588">
+              <a:tr h="540067">
                 <a:tc>
                   <a:txBody>
                     <a:bodyPr/>
@@ -6296,7 +6369,10 @@
                     <a:bodyPr/>
                     <a:lstStyle/>
                     <a:p>
-                      <a:endParaRPr lang="en-IE"/>
+                      <a:r>
+                        <a:rPr lang="en-IE" dirty="0"/>
+                        <a:t>Since there is not a problem currently, we can design to match current size, which also matches the physical resource size. This can be resized later if necessary </a:t>
+                      </a:r>
                     </a:p>
                   </a:txBody>
                   <a:tcPr/>
@@ -6405,7 +6481,7 @@
         </p:nvSpPr>
         <p:spPr>
           <a:xfrm>
-            <a:off x="838200" y="1105434"/>
+            <a:off x="830108" y="1105434"/>
             <a:ext cx="10515600" cy="1192704"/>
           </a:xfrm>
         </p:spPr>
@@ -6424,7 +6500,7 @@
             </a:pPr>
             <a:r>
               <a:rPr lang="en-US" sz="2000" dirty="0"/>
-              <a:t>Since all the servers that the users are connecting to are stateless, We can create images dynamically every four hours</a:t>
+              <a:t>Since all the servers that the users are connecting to are stateless, We can create images dynamically every four hours of the EB2, and the RDS,</a:t>
             </a:r>
             <a:r>
               <a:rPr lang="en-GB" sz="2000" dirty="0"/>
@@ -6722,14 +6798,14 @@
             <p:ph idx="1"/>
             <p:extLst>
               <p:ext uri="{D42A27DB-BD31-4B8C-83A1-F6EECF244321}">
-                <p14:modId xmlns:p14="http://schemas.microsoft.com/office/powerpoint/2010/main" val="4133806743"/>
+                <p14:modId xmlns:p14="http://schemas.microsoft.com/office/powerpoint/2010/main" val="2620880135"/>
               </p:ext>
             </p:extLst>
           </p:nvPr>
         </p:nvGraphicFramePr>
         <p:xfrm>
-          <a:off x="838200" y="1825625"/>
-          <a:ext cx="10515600" cy="3114040"/>
+          <a:off x="139337" y="1485989"/>
+          <a:ext cx="11895909" cy="4444547"/>
         </p:xfrm>
         <a:graphic>
           <a:graphicData uri="http://schemas.openxmlformats.org/drawingml/2006/table">
@@ -6738,14 +6814,14 @@
                 <a:tableStyleId>{00A15C55-8517-42AA-B614-E9B94910E393}</a:tableStyleId>
               </a:tblPr>
               <a:tblGrid>
-                <a:gridCol w="5257800">
+                <a:gridCol w="4765752">
                   <a:extLst>
                     <a:ext uri="{9D8B030D-6E8A-4147-A177-3AD203B41FA5}">
                       <a16:colId xmlns:a16="http://schemas.microsoft.com/office/drawing/2014/main" val="1600332229"/>
                     </a:ext>
                   </a:extLst>
                 </a:gridCol>
-                <a:gridCol w="5257800">
+                <a:gridCol w="7130157">
                   <a:extLst>
                     <a:ext uri="{9D8B030D-6E8A-4147-A177-3AD203B41FA5}">
                       <a16:colId xmlns:a16="http://schemas.microsoft.com/office/drawing/2014/main" val="4026596752"/>
@@ -6753,7 +6829,7 @@
                   </a:extLst>
                 </a:gridCol>
               </a:tblGrid>
-              <a:tr h="370840">
+              <a:tr h="418648">
                 <a:tc>
                   <a:txBody>
                     <a:bodyPr/>
@@ -6794,7 +6870,7 @@
                   </a:ext>
                 </a:extLst>
               </a:tr>
-              <a:tr h="370840">
+              <a:tr h="722597">
                 <a:tc>
                   <a:txBody>
                     <a:bodyPr/>
@@ -6820,7 +6896,10 @@
                     <a:bodyPr/>
                     <a:lstStyle/>
                     <a:p>
-                      <a:endParaRPr lang="en-IE"/>
+                      <a:r>
+                        <a:rPr lang="en-IE" dirty="0"/>
+                        <a:t>Enable the Web Tier design to scale in or out depending on the CloudWatch configuration</a:t>
+                      </a:r>
                     </a:p>
                   </a:txBody>
                   <a:tcPr/>
@@ -6831,7 +6910,7 @@
                   </a:ext>
                 </a:extLst>
               </a:tr>
-              <a:tr h="370840">
+              <a:tr h="1961336">
                 <a:tc>
                   <a:txBody>
                     <a:bodyPr/>
@@ -6853,10 +6932,8 @@
                       </a:r>
                       <a:r>
                         <a:rPr lang="en-US" dirty="0"/>
-                        <a:t> and 750</a:t>
-                      </a:r>
-                    </a:p>
-                    <a:p>
+                        <a:t> and 750 </a:t>
+                      </a:r>
                       <a:r>
                         <a:rPr lang="en-US" dirty="0" err="1"/>
                         <a:t>Mbps</a:t>
@@ -6875,7 +6952,10 @@
                     <a:bodyPr/>
                     <a:lstStyle/>
                     <a:p>
-                      <a:endParaRPr lang="en-IE"/>
+                      <a:r>
+                        <a:rPr lang="en-IE" dirty="0"/>
+                        <a:t>Configure CloudWatch so that it ensures the Auto Scale starts new Web servers when the incoming network bandwidth reaches above the750 MBS for approximately 10 - 15 minutes to allow a little bit of flexibility. If the MBS falls below 300, We set a timer for between 10 &amp; 15 minutes for terminating the web servers that are not needed. This is to save some of the costs and to ensure we do not have Auto Scaling Thrashing</a:t>
+                      </a:r>
                     </a:p>
                   </a:txBody>
                   <a:tcPr/>
@@ -6886,7 +6966,7 @@
                   </a:ext>
                 </a:extLst>
               </a:tr>
-              <a:tr h="370840">
+              <a:tr h="1341966">
                 <a:tc>
                   <a:txBody>
                     <a:bodyPr/>
@@ -6924,7 +7004,16 @@
                     <a:bodyPr/>
                     <a:lstStyle/>
                     <a:p>
-                      <a:endParaRPr lang="en-IE" dirty="0"/>
+                      <a:r>
+                        <a:rPr lang="en-IE" dirty="0"/>
+                        <a:t>Configure CloudWatch to log the 400 HTTP errors per minute in the Application and set up a Alarm for such case. </a:t>
+                      </a:r>
+                    </a:p>
+                    <a:p>
+                      <a:r>
+                        <a:rPr lang="en-IE" dirty="0"/>
+                        <a:t>If the error does occur, send a notification to the Application Administrators.</a:t>
+                      </a:r>
                     </a:p>
                   </a:txBody>
                   <a:tcPr/>
@@ -7013,14 +7102,14 @@
             <p:ph idx="1"/>
             <p:extLst>
               <p:ext uri="{D42A27DB-BD31-4B8C-83A1-F6EECF244321}">
-                <p14:modId xmlns:p14="http://schemas.microsoft.com/office/powerpoint/2010/main" val="561090716"/>
+                <p14:modId xmlns:p14="http://schemas.microsoft.com/office/powerpoint/2010/main" val="2909311566"/>
               </p:ext>
             </p:extLst>
           </p:nvPr>
         </p:nvGraphicFramePr>
         <p:xfrm>
-          <a:off x="838200" y="1825625"/>
-          <a:ext cx="10515600" cy="3388360"/>
+          <a:off x="313509" y="1760056"/>
+          <a:ext cx="11040291" cy="4243663"/>
         </p:xfrm>
         <a:graphic>
           <a:graphicData uri="http://schemas.openxmlformats.org/drawingml/2006/table">
@@ -7029,14 +7118,14 @@
                 <a:tableStyleId>{00A15C55-8517-42AA-B614-E9B94910E393}</a:tableStyleId>
               </a:tblPr>
               <a:tblGrid>
-                <a:gridCol w="5257800">
+                <a:gridCol w="3416919">
                   <a:extLst>
                     <a:ext uri="{9D8B030D-6E8A-4147-A177-3AD203B41FA5}">
                       <a16:colId xmlns:a16="http://schemas.microsoft.com/office/drawing/2014/main" val="3204209028"/>
                     </a:ext>
                   </a:extLst>
                 </a:gridCol>
-                <a:gridCol w="5257800">
+                <a:gridCol w="7623372">
                   <a:extLst>
                     <a:ext uri="{9D8B030D-6E8A-4147-A177-3AD203B41FA5}">
                       <a16:colId xmlns:a16="http://schemas.microsoft.com/office/drawing/2014/main" val="1997133159"/>
@@ -7044,7 +7133,7 @@
                   </a:extLst>
                 </a:gridCol>
               </a:tblGrid>
-              <a:tr h="370840">
+              <a:tr h="422541">
                 <a:tc>
                   <a:txBody>
                     <a:bodyPr/>
@@ -7068,18 +7157,13 @@
                     <a:lstStyle/>
                     <a:p>
                       <a:r>
-                        <a:rPr lang="en-IE" dirty="0" err="1">
+                        <a:rPr lang="en-IE" dirty="0">
                           <a:solidFill>
                             <a:schemeClr val="tx1"/>
                           </a:solidFill>
                         </a:rPr>
-                        <a:t>Soloution</a:t>
-                      </a:r>
-                      <a:endParaRPr lang="en-IE" dirty="0">
-                        <a:solidFill>
-                          <a:schemeClr val="tx1"/>
-                        </a:solidFill>
-                      </a:endParaRPr>
+                        <a:t>Solution</a:t>
+                      </a:r>
                     </a:p>
                   </a:txBody>
                   <a:tcPr/>
@@ -7090,7 +7174,7 @@
                   </a:ext>
                 </a:extLst>
               </a:tr>
-              <a:tr h="370840">
+              <a:tr h="1041881">
                 <a:tc>
                   <a:txBody>
                     <a:bodyPr/>
@@ -7122,7 +7206,27 @@
                     <a:bodyPr/>
                     <a:lstStyle/>
                     <a:p>
-                      <a:endParaRPr lang="en-IE"/>
+                      <a:pPr marL="0" marR="0" lvl="0" indent="0" algn="l" defTabSz="914400" rtl="0" eaLnBrk="1" fontAlgn="auto" latinLnBrk="0" hangingPunct="1">
+                        <a:lnSpc>
+                          <a:spcPct val="100000"/>
+                        </a:lnSpc>
+                        <a:spcBef>
+                          <a:spcPts val="0"/>
+                        </a:spcBef>
+                        <a:spcAft>
+                          <a:spcPts val="0"/>
+                        </a:spcAft>
+                        <a:buClrTx/>
+                        <a:buSzTx/>
+                        <a:buFontTx/>
+                        <a:buNone/>
+                        <a:tabLst/>
+                        <a:defRPr/>
+                      </a:pPr>
+                      <a:r>
+                        <a:rPr lang="en-IE" dirty="0"/>
+                        <a:t>Enable the App Tier design to scale in or out depending on the CloudWatch configuration</a:t>
+                      </a:r>
                     </a:p>
                   </a:txBody>
                   <a:tcPr/>
@@ -7133,7 +7237,7 @@
                   </a:ext>
                 </a:extLst>
               </a:tr>
-              <a:tr h="370840">
+              <a:tr h="1667009">
                 <a:tc>
                   <a:txBody>
                     <a:bodyPr/>
@@ -7171,7 +7275,10 @@
                     <a:bodyPr/>
                     <a:lstStyle/>
                     <a:p>
-                      <a:endParaRPr lang="en-IE"/>
+                      <a:r>
+                        <a:rPr lang="en-IE" dirty="0"/>
+                        <a:t>Configure CloudWatch so that it ensures the Auto Scale starts new App servers when the overall memory utilization reaches above the 80% and the CPU when that goes above 75% for approximately 10 - 15 minutes to allow for some heavy computing work.  If the Percentage falls below 30, We set a timer for ten to fifteen minutes for terminating the web servers that are not needed. This is to save some of the costs and to ensure we do not have Auto Scaling Thrashing</a:t>
+                      </a:r>
                     </a:p>
                   </a:txBody>
                   <a:tcPr/>
@@ -7182,7 +7289,7 @@
                   </a:ext>
                 </a:extLst>
               </a:tr>
-              <a:tr h="370840">
+              <a:tr h="1041881">
                 <a:tc>
                   <a:txBody>
                     <a:bodyPr/>
@@ -7214,7 +7321,10 @@
                     <a:bodyPr/>
                     <a:lstStyle/>
                     <a:p>
-                      <a:endParaRPr lang="en-IE" dirty="0"/>
+                      <a:r>
+                        <a:rPr lang="en-IE" dirty="0"/>
+                        <a:t>Ensuring that the NAT and the VPC routing table are configured properly to reroute the traffic to an available subnets &amp; gateways before working on the patches and updates for the application</a:t>
+                      </a:r>
                     </a:p>
                   </a:txBody>
                   <a:tcPr/>
@@ -7303,14 +7413,14 @@
             <p:ph idx="1"/>
             <p:extLst>
               <p:ext uri="{D42A27DB-BD31-4B8C-83A1-F6EECF244321}">
-                <p14:modId xmlns:p14="http://schemas.microsoft.com/office/powerpoint/2010/main" val="3359905136"/>
+                <p14:modId xmlns:p14="http://schemas.microsoft.com/office/powerpoint/2010/main" val="1808399623"/>
               </p:ext>
             </p:extLst>
           </p:nvPr>
         </p:nvGraphicFramePr>
         <p:xfrm>
           <a:off x="838200" y="1825625"/>
-          <a:ext cx="10515600" cy="2021840"/>
+          <a:ext cx="10515600" cy="3114040"/>
         </p:xfrm>
         <a:graphic>
           <a:graphicData uri="http://schemas.openxmlformats.org/drawingml/2006/table">
@@ -7400,7 +7510,10 @@
                     <a:bodyPr/>
                     <a:lstStyle/>
                     <a:p>
-                      <a:endParaRPr lang="en-IE"/>
+                      <a:r>
+                        <a:rPr lang="en-IE" dirty="0"/>
+                        <a:t>Create the RDS to use Provisioned IOPS / SDD Storage as that has the Max IPOS / Volume of 32,000</a:t>
+                      </a:r>
                     </a:p>
                   </a:txBody>
                   <a:tcPr/>
@@ -7431,7 +7544,10 @@
                     <a:bodyPr/>
                     <a:lstStyle/>
                     <a:p>
-                      <a:endParaRPr lang="en-IE"/>
+                      <a:r>
+                        <a:rPr lang="en-IE" dirty="0"/>
+                        <a:t>Ensure that there is a main RDS in one of the Multi-Zone deployments Zones and a secondary one in another zone that is synchronised to store the same data</a:t>
+                      </a:r>
                     </a:p>
                   </a:txBody>
                   <a:tcPr/>
@@ -7468,7 +7584,10 @@
                     <a:bodyPr/>
                     <a:lstStyle/>
                     <a:p>
-                      <a:endParaRPr lang="en-IE" dirty="0"/>
+                      <a:r>
+                        <a:rPr lang="en-IE" dirty="0"/>
+                        <a:t>Ensure the MySQL 5.6.22 is chosen in the creation of the RDS so the process of the migration from Physical to virtual / Cloud services for the Database is smooth</a:t>
+                      </a:r>
                     </a:p>
                   </a:txBody>
                   <a:tcPr/>

</xml_diff>

<commit_message>
polishing my cloud assignment
</commit_message>
<xml_diff>
--- a/Cloud_Computing/Labs/Assignment/part 2/Cloud-Computing-Assignment-2.pptx
+++ b/Cloud_Computing/Labs/Assignment/part 2/Cloud-Computing-Assignment-2.pptx
@@ -272,7 +272,7 @@
           <a:p>
             <a:fld id="{FB15029A-EAF4-46E5-A5A0-8E8E4D5788BC}" type="datetimeFigureOut">
               <a:rPr lang="en-IE" smtClean="0"/>
-              <a:t>12/12/2018</a:t>
+              <a:t>13/12/2018</a:t>
             </a:fld>
             <a:endParaRPr lang="en-IE"/>
           </a:p>
@@ -472,7 +472,7 @@
           <a:p>
             <a:fld id="{FB15029A-EAF4-46E5-A5A0-8E8E4D5788BC}" type="datetimeFigureOut">
               <a:rPr lang="en-IE" smtClean="0"/>
-              <a:t>12/12/2018</a:t>
+              <a:t>13/12/2018</a:t>
             </a:fld>
             <a:endParaRPr lang="en-IE"/>
           </a:p>
@@ -682,7 +682,7 @@
           <a:p>
             <a:fld id="{FB15029A-EAF4-46E5-A5A0-8E8E4D5788BC}" type="datetimeFigureOut">
               <a:rPr lang="en-IE" smtClean="0"/>
-              <a:t>12/12/2018</a:t>
+              <a:t>13/12/2018</a:t>
             </a:fld>
             <a:endParaRPr lang="en-IE"/>
           </a:p>
@@ -882,7 +882,7 @@
           <a:p>
             <a:fld id="{FB15029A-EAF4-46E5-A5A0-8E8E4D5788BC}" type="datetimeFigureOut">
               <a:rPr lang="en-IE" smtClean="0"/>
-              <a:t>12/12/2018</a:t>
+              <a:t>13/12/2018</a:t>
             </a:fld>
             <a:endParaRPr lang="en-IE"/>
           </a:p>
@@ -1158,7 +1158,7 @@
           <a:p>
             <a:fld id="{FB15029A-EAF4-46E5-A5A0-8E8E4D5788BC}" type="datetimeFigureOut">
               <a:rPr lang="en-IE" smtClean="0"/>
-              <a:t>12/12/2018</a:t>
+              <a:t>13/12/2018</a:t>
             </a:fld>
             <a:endParaRPr lang="en-IE"/>
           </a:p>
@@ -1426,7 +1426,7 @@
           <a:p>
             <a:fld id="{FB15029A-EAF4-46E5-A5A0-8E8E4D5788BC}" type="datetimeFigureOut">
               <a:rPr lang="en-IE" smtClean="0"/>
-              <a:t>12/12/2018</a:t>
+              <a:t>13/12/2018</a:t>
             </a:fld>
             <a:endParaRPr lang="en-IE"/>
           </a:p>
@@ -1841,7 +1841,7 @@
           <a:p>
             <a:fld id="{FB15029A-EAF4-46E5-A5A0-8E8E4D5788BC}" type="datetimeFigureOut">
               <a:rPr lang="en-IE" smtClean="0"/>
-              <a:t>12/12/2018</a:t>
+              <a:t>13/12/2018</a:t>
             </a:fld>
             <a:endParaRPr lang="en-IE"/>
           </a:p>
@@ -1983,7 +1983,7 @@
           <a:p>
             <a:fld id="{FB15029A-EAF4-46E5-A5A0-8E8E4D5788BC}" type="datetimeFigureOut">
               <a:rPr lang="en-IE" smtClean="0"/>
-              <a:t>12/12/2018</a:t>
+              <a:t>13/12/2018</a:t>
             </a:fld>
             <a:endParaRPr lang="en-IE"/>
           </a:p>
@@ -2096,7 +2096,7 @@
           <a:p>
             <a:fld id="{FB15029A-EAF4-46E5-A5A0-8E8E4D5788BC}" type="datetimeFigureOut">
               <a:rPr lang="en-IE" smtClean="0"/>
-              <a:t>12/12/2018</a:t>
+              <a:t>13/12/2018</a:t>
             </a:fld>
             <a:endParaRPr lang="en-IE"/>
           </a:p>
@@ -2409,7 +2409,7 @@
           <a:p>
             <a:fld id="{FB15029A-EAF4-46E5-A5A0-8E8E4D5788BC}" type="datetimeFigureOut">
               <a:rPr lang="en-IE" smtClean="0"/>
-              <a:t>12/12/2018</a:t>
+              <a:t>13/12/2018</a:t>
             </a:fld>
             <a:endParaRPr lang="en-IE"/>
           </a:p>
@@ -2698,7 +2698,7 @@
           <a:p>
             <a:fld id="{FB15029A-EAF4-46E5-A5A0-8E8E4D5788BC}" type="datetimeFigureOut">
               <a:rPr lang="en-IE" smtClean="0"/>
-              <a:t>12/12/2018</a:t>
+              <a:t>13/12/2018</a:t>
             </a:fld>
             <a:endParaRPr lang="en-IE"/>
           </a:p>
@@ -2941,7 +2941,7 @@
           <a:p>
             <a:fld id="{FB15029A-EAF4-46E5-A5A0-8E8E4D5788BC}" type="datetimeFigureOut">
               <a:rPr lang="en-IE" smtClean="0"/>
-              <a:t>12/12/2018</a:t>
+              <a:t>13/12/2018</a:t>
             </a:fld>
             <a:endParaRPr lang="en-IE"/>
           </a:p>
@@ -3700,11 +3700,17 @@
             <p:ph type="title"/>
           </p:nvPr>
         </p:nvSpPr>
-        <p:spPr/>
+        <p:spPr>
+          <a:xfrm>
+            <a:off x="838200" y="162824"/>
+            <a:ext cx="10515600" cy="1325563"/>
+          </a:xfrm>
+        </p:spPr>
         <p:txBody>
           <a:bodyPr/>
           <a:lstStyle/>
           <a:p>
+            <a:pPr algn="ctr"/>
             <a:r>
               <a:rPr lang="en-IE" dirty="0"/>
               <a:t>Proposed Architecture Diagram</a:t>
@@ -3712,31 +3718,41 @@
           </a:p>
         </p:txBody>
       </p:sp>
-      <p:sp>
-        <p:nvSpPr>
-          <p:cNvPr id="3" name="Content Placeholder 2">
-            <a:extLst>
-              <a:ext uri="{FF2B5EF4-FFF2-40B4-BE49-F238E27FC236}">
-                <a16:creationId xmlns:a16="http://schemas.microsoft.com/office/drawing/2014/main" id="{61F5481A-8111-441D-A59D-577FB0A52915}"/>
-              </a:ext>
-            </a:extLst>
-          </p:cNvPr>
-          <p:cNvSpPr>
-            <a:spLocks noGrp="1"/>
-          </p:cNvSpPr>
+      <p:pic>
+        <p:nvPicPr>
+          <p:cNvPr id="9" name="Content Placeholder 8" descr="A close up of a map&#10;&#10;Description generated with very high confidence">
+            <a:extLst>
+              <a:ext uri="{FF2B5EF4-FFF2-40B4-BE49-F238E27FC236}">
+                <a16:creationId xmlns:a16="http://schemas.microsoft.com/office/drawing/2014/main" id="{02AE5CEC-75DE-4599-94BE-4AD846918217}"/>
+              </a:ext>
+            </a:extLst>
+          </p:cNvPr>
+          <p:cNvPicPr>
+            <a:picLocks noGrp="1" noChangeAspect="1"/>
+          </p:cNvPicPr>
           <p:nvPr>
             <p:ph idx="1"/>
           </p:nvPr>
-        </p:nvSpPr>
-        <p:spPr/>
-        <p:txBody>
-          <a:bodyPr/>
-          <a:lstStyle/>
-          <a:p>
-            <a:endParaRPr lang="en-IE"/>
-          </a:p>
-        </p:txBody>
-      </p:sp>
+        </p:nvPicPr>
+        <p:blipFill>
+          <a:blip r:embed="rId2">
+            <a:extLst>
+              <a:ext uri="{28A0092B-C50C-407E-A947-70E740481C1C}">
+                <a14:useLocalDpi xmlns:a14="http://schemas.microsoft.com/office/drawing/2010/main" val="0"/>
+              </a:ext>
+            </a:extLst>
+          </a:blip>
+          <a:stretch>
+            <a:fillRect/>
+          </a:stretch>
+        </p:blipFill>
+        <p:spPr>
+          <a:xfrm>
+            <a:off x="1519954" y="1348194"/>
+            <a:ext cx="9152092" cy="5346982"/>
+          </a:xfrm>
+        </p:spPr>
+      </p:pic>
     </p:spTree>
     <p:extLst>
       <p:ext uri="{BB962C8B-B14F-4D97-AF65-F5344CB8AC3E}">
@@ -3811,14 +3827,14 @@
             <p:ph idx="1"/>
             <p:extLst>
               <p:ext uri="{D42A27DB-BD31-4B8C-83A1-F6EECF244321}">
-                <p14:modId xmlns:p14="http://schemas.microsoft.com/office/powerpoint/2010/main" val="4196336964"/>
+                <p14:modId xmlns:p14="http://schemas.microsoft.com/office/powerpoint/2010/main" val="1085156298"/>
               </p:ext>
             </p:extLst>
           </p:nvPr>
         </p:nvGraphicFramePr>
         <p:xfrm>
-          <a:off x="768743" y="1825625"/>
-          <a:ext cx="10585057" cy="1112520"/>
+          <a:off x="768743" y="1690688"/>
+          <a:ext cx="10585057" cy="1381760"/>
         </p:xfrm>
         <a:graphic>
           <a:graphicData uri="http://schemas.openxmlformats.org/drawingml/2006/table">
@@ -3977,6 +3993,12 @@
                       <a:r>
                         <a:rPr lang="en-IE" dirty="0"/>
                         <a:t>US-West 1</a:t>
+                      </a:r>
+                    </a:p>
+                    <a:p>
+                      <a:r>
+                        <a:rPr lang="en-IE" dirty="0"/>
+                        <a:t>EU-West 2</a:t>
                       </a:r>
                     </a:p>
                   </a:txBody>

</xml_diff>

<commit_message>
completed to my best understanding cloud assigment
</commit_message>
<xml_diff>
--- a/Cloud_Computing/Labs/Assignment/part 2/Cloud-Computing-Assignment-2.pptx
+++ b/Cloud_Computing/Labs/Assignment/part 2/Cloud-Computing-Assignment-2.pptx
@@ -272,7 +272,7 @@
           <a:p>
             <a:fld id="{FB15029A-EAF4-46E5-A5A0-8E8E4D5788BC}" type="datetimeFigureOut">
               <a:rPr lang="en-IE" smtClean="0"/>
-              <a:t>13/12/2018</a:t>
+              <a:t>14/12/2018</a:t>
             </a:fld>
             <a:endParaRPr lang="en-IE"/>
           </a:p>
@@ -472,7 +472,7 @@
           <a:p>
             <a:fld id="{FB15029A-EAF4-46E5-A5A0-8E8E4D5788BC}" type="datetimeFigureOut">
               <a:rPr lang="en-IE" smtClean="0"/>
-              <a:t>13/12/2018</a:t>
+              <a:t>14/12/2018</a:t>
             </a:fld>
             <a:endParaRPr lang="en-IE"/>
           </a:p>
@@ -682,7 +682,7 @@
           <a:p>
             <a:fld id="{FB15029A-EAF4-46E5-A5A0-8E8E4D5788BC}" type="datetimeFigureOut">
               <a:rPr lang="en-IE" smtClean="0"/>
-              <a:t>13/12/2018</a:t>
+              <a:t>14/12/2018</a:t>
             </a:fld>
             <a:endParaRPr lang="en-IE"/>
           </a:p>
@@ -882,7 +882,7 @@
           <a:p>
             <a:fld id="{FB15029A-EAF4-46E5-A5A0-8E8E4D5788BC}" type="datetimeFigureOut">
               <a:rPr lang="en-IE" smtClean="0"/>
-              <a:t>13/12/2018</a:t>
+              <a:t>14/12/2018</a:t>
             </a:fld>
             <a:endParaRPr lang="en-IE"/>
           </a:p>
@@ -1158,7 +1158,7 @@
           <a:p>
             <a:fld id="{FB15029A-EAF4-46E5-A5A0-8E8E4D5788BC}" type="datetimeFigureOut">
               <a:rPr lang="en-IE" smtClean="0"/>
-              <a:t>13/12/2018</a:t>
+              <a:t>14/12/2018</a:t>
             </a:fld>
             <a:endParaRPr lang="en-IE"/>
           </a:p>
@@ -1426,7 +1426,7 @@
           <a:p>
             <a:fld id="{FB15029A-EAF4-46E5-A5A0-8E8E4D5788BC}" type="datetimeFigureOut">
               <a:rPr lang="en-IE" smtClean="0"/>
-              <a:t>13/12/2018</a:t>
+              <a:t>14/12/2018</a:t>
             </a:fld>
             <a:endParaRPr lang="en-IE"/>
           </a:p>
@@ -1841,7 +1841,7 @@
           <a:p>
             <a:fld id="{FB15029A-EAF4-46E5-A5A0-8E8E4D5788BC}" type="datetimeFigureOut">
               <a:rPr lang="en-IE" smtClean="0"/>
-              <a:t>13/12/2018</a:t>
+              <a:t>14/12/2018</a:t>
             </a:fld>
             <a:endParaRPr lang="en-IE"/>
           </a:p>
@@ -1983,7 +1983,7 @@
           <a:p>
             <a:fld id="{FB15029A-EAF4-46E5-A5A0-8E8E4D5788BC}" type="datetimeFigureOut">
               <a:rPr lang="en-IE" smtClean="0"/>
-              <a:t>13/12/2018</a:t>
+              <a:t>14/12/2018</a:t>
             </a:fld>
             <a:endParaRPr lang="en-IE"/>
           </a:p>
@@ -2096,7 +2096,7 @@
           <a:p>
             <a:fld id="{FB15029A-EAF4-46E5-A5A0-8E8E4D5788BC}" type="datetimeFigureOut">
               <a:rPr lang="en-IE" smtClean="0"/>
-              <a:t>13/12/2018</a:t>
+              <a:t>14/12/2018</a:t>
             </a:fld>
             <a:endParaRPr lang="en-IE"/>
           </a:p>
@@ -2409,7 +2409,7 @@
           <a:p>
             <a:fld id="{FB15029A-EAF4-46E5-A5A0-8E8E4D5788BC}" type="datetimeFigureOut">
               <a:rPr lang="en-IE" smtClean="0"/>
-              <a:t>13/12/2018</a:t>
+              <a:t>14/12/2018</a:t>
             </a:fld>
             <a:endParaRPr lang="en-IE"/>
           </a:p>
@@ -2698,7 +2698,7 @@
           <a:p>
             <a:fld id="{FB15029A-EAF4-46E5-A5A0-8E8E4D5788BC}" type="datetimeFigureOut">
               <a:rPr lang="en-IE" smtClean="0"/>
-              <a:t>13/12/2018</a:t>
+              <a:t>14/12/2018</a:t>
             </a:fld>
             <a:endParaRPr lang="en-IE"/>
           </a:p>
@@ -2941,7 +2941,7 @@
           <a:p>
             <a:fld id="{FB15029A-EAF4-46E5-A5A0-8E8E4D5788BC}" type="datetimeFigureOut">
               <a:rPr lang="en-IE" smtClean="0"/>
-              <a:t>13/12/2018</a:t>
+              <a:t>14/12/2018</a:t>
             </a:fld>
             <a:endParaRPr lang="en-IE"/>
           </a:p>
@@ -3393,8 +3393,13 @@
             </a:br>
             <a:r>
               <a:rPr lang="en-IE" dirty="0"/>
-              <a:t>Final Part</a:t>
-            </a:r>
+              <a:t>Final Part - </a:t>
+            </a:r>
+            <a:r>
+              <a:rPr lang="en-IE" dirty="0" err="1"/>
+              <a:t>GoGreen</a:t>
+            </a:r>
+            <a:endParaRPr lang="en-IE" dirty="0"/>
           </a:p>
         </p:txBody>
       </p:sp>
@@ -4969,7 +4974,7 @@
             <p:ph idx="1"/>
             <p:extLst>
               <p:ext uri="{D42A27DB-BD31-4B8C-83A1-F6EECF244321}">
-                <p14:modId xmlns:p14="http://schemas.microsoft.com/office/powerpoint/2010/main" val="3816392166"/>
+                <p14:modId xmlns:p14="http://schemas.microsoft.com/office/powerpoint/2010/main" val="2191830175"/>
               </p:ext>
             </p:extLst>
           </p:nvPr>
@@ -5304,7 +5309,7 @@
                     <a:p>
                       <a:r>
                         <a:rPr lang="en-IE" dirty="0"/>
-                        <a:t>Allow 3306</a:t>
+                        <a:t>Allow 1433</a:t>
                       </a:r>
                     </a:p>
                   </a:txBody>

</xml_diff>